<commit_message>
add final version of presentation
</commit_message>
<xml_diff>
--- a/Non-R/2023 May Lunchtime presentation, payrolled employments.pptx
+++ b/Non-R/2023 May Lunchtime presentation, payrolled employments.pptx
@@ -18,9 +18,9 @@
     <p:sldId id="266" r:id="rId12"/>
     <p:sldId id="272" r:id="rId13"/>
     <p:sldId id="260" r:id="rId14"/>
-    <p:sldId id="267" r:id="rId15"/>
-    <p:sldId id="270" r:id="rId16"/>
-    <p:sldId id="268" r:id="rId17"/>
+    <p:sldId id="273" r:id="rId15"/>
+    <p:sldId id="267" r:id="rId16"/>
+    <p:sldId id="270" r:id="rId17"/>
     <p:sldId id="269" r:id="rId18"/>
     <p:sldId id="271" r:id="rId19"/>
   </p:sldIdLst>
@@ -241,7 +241,7 @@
   <pc:docChgLst>
     <pc:chgData name="Ammar Ljubijankic" userId="a00b5204-d72f-418c-8b5e-7555aa3641ec" providerId="ADAL" clId="{0D28BE98-19B5-45BC-9736-94050ED36038}"/>
     <pc:docChg chg="undo custSel addSld delSld modSld sldOrd">
-      <pc:chgData name="Ammar Ljubijankic" userId="a00b5204-d72f-418c-8b5e-7555aa3641ec" providerId="ADAL" clId="{0D28BE98-19B5-45BC-9736-94050ED36038}" dt="2023-05-19T12:59:50.846" v="12657" actId="207"/>
+      <pc:chgData name="Ammar Ljubijankic" userId="a00b5204-d72f-418c-8b5e-7555aa3641ec" providerId="ADAL" clId="{0D28BE98-19B5-45BC-9736-94050ED36038}" dt="2023-05-23T09:21:52.520" v="13014" actId="47"/>
       <pc:docMkLst>
         <pc:docMk/>
       </pc:docMkLst>
@@ -610,7 +610,7 @@
         </pc:picChg>
       </pc:sldChg>
       <pc:sldChg chg="modSp new mod">
-        <pc:chgData name="Ammar Ljubijankic" userId="a00b5204-d72f-418c-8b5e-7555aa3641ec" providerId="ADAL" clId="{0D28BE98-19B5-45BC-9736-94050ED36038}" dt="2023-05-17T13:58:21.405" v="11281"/>
+        <pc:chgData name="Ammar Ljubijankic" userId="a00b5204-d72f-418c-8b5e-7555aa3641ec" providerId="ADAL" clId="{0D28BE98-19B5-45BC-9736-94050ED36038}" dt="2023-05-22T15:15:58.948" v="12704" actId="20577"/>
         <pc:sldMkLst>
           <pc:docMk/>
           <pc:sldMk cId="1918475658" sldId="260"/>
@@ -624,7 +624,7 @@
           </ac:spMkLst>
         </pc:spChg>
         <pc:spChg chg="mod">
-          <ac:chgData name="Ammar Ljubijankic" userId="a00b5204-d72f-418c-8b5e-7555aa3641ec" providerId="ADAL" clId="{0D28BE98-19B5-45BC-9736-94050ED36038}" dt="2023-05-17T13:58:21.405" v="11281"/>
+          <ac:chgData name="Ammar Ljubijankic" userId="a00b5204-d72f-418c-8b5e-7555aa3641ec" providerId="ADAL" clId="{0D28BE98-19B5-45BC-9736-94050ED36038}" dt="2023-05-22T15:15:58.948" v="12704" actId="20577"/>
           <ac:spMkLst>
             <pc:docMk/>
             <pc:sldMk cId="1918475658" sldId="260"/>
@@ -956,7 +956,7 @@
         </pc:sldMkLst>
       </pc:sldChg>
       <pc:sldChg chg="addSp delSp modSp new mod ord modClrScheme chgLayout modNotesTx">
-        <pc:chgData name="Ammar Ljubijankic" userId="a00b5204-d72f-418c-8b5e-7555aa3641ec" providerId="ADAL" clId="{0D28BE98-19B5-45BC-9736-94050ED36038}" dt="2023-05-17T15:38:07.198" v="11526" actId="404"/>
+        <pc:chgData name="Ammar Ljubijankic" userId="a00b5204-d72f-418c-8b5e-7555aa3641ec" providerId="ADAL" clId="{0D28BE98-19B5-45BC-9736-94050ED36038}" dt="2023-05-22T15:16:21.515" v="12719" actId="20577"/>
         <pc:sldMkLst>
           <pc:docMk/>
           <pc:sldMk cId="3596054253" sldId="266"/>
@@ -1336,8 +1336,8 @@
           </ac:picMkLst>
         </pc:picChg>
       </pc:sldChg>
-      <pc:sldChg chg="addSp delSp modSp new mod modClrScheme chgLayout">
-        <pc:chgData name="Ammar Ljubijankic" userId="a00b5204-d72f-418c-8b5e-7555aa3641ec" providerId="ADAL" clId="{0D28BE98-19B5-45BC-9736-94050ED36038}" dt="2023-05-19T11:20:07.272" v="11707"/>
+      <pc:sldChg chg="addSp delSp modSp new del mod modClrScheme chgLayout">
+        <pc:chgData name="Ammar Ljubijankic" userId="a00b5204-d72f-418c-8b5e-7555aa3641ec" providerId="ADAL" clId="{0D28BE98-19B5-45BC-9736-94050ED36038}" dt="2023-05-23T09:21:52.520" v="13014" actId="47"/>
         <pc:sldMkLst>
           <pc:docMk/>
           <pc:sldMk cId="1921322513" sldId="268"/>
@@ -1589,7 +1589,7 @@
         </pc:picChg>
       </pc:sldChg>
       <pc:sldChg chg="addSp delSp modSp new mod modClrScheme chgLayout modNotesTx">
-        <pc:chgData name="Ammar Ljubijankic" userId="a00b5204-d72f-418c-8b5e-7555aa3641ec" providerId="ADAL" clId="{0D28BE98-19B5-45BC-9736-94050ED36038}" dt="2023-05-19T11:24:41.366" v="12636" actId="20577"/>
+        <pc:chgData name="Ammar Ljubijankic" userId="a00b5204-d72f-418c-8b5e-7555aa3641ec" providerId="ADAL" clId="{0D28BE98-19B5-45BC-9736-94050ED36038}" dt="2023-05-23T09:00:24.269" v="13013" actId="20577"/>
         <pc:sldMkLst>
           <pc:docMk/>
           <pc:sldMk cId="1554372116" sldId="272"/>
@@ -1650,6 +1650,61 @@
             <ac:picMk id="8" creationId="{0AE9EABB-CB08-0F08-02DE-250C715E4947}"/>
           </ac:picMkLst>
         </pc:picChg>
+      </pc:sldChg>
+      <pc:sldChg chg="addSp delSp modSp new mod modClrScheme chgLayout">
+        <pc:chgData name="Ammar Ljubijankic" userId="a00b5204-d72f-418c-8b5e-7555aa3641ec" providerId="ADAL" clId="{0D28BE98-19B5-45BC-9736-94050ED36038}" dt="2023-05-22T15:15:25.125" v="12690" actId="20577"/>
+        <pc:sldMkLst>
+          <pc:docMk/>
+          <pc:sldMk cId="1446615163" sldId="273"/>
+        </pc:sldMkLst>
+        <pc:spChg chg="del mod ord">
+          <ac:chgData name="Ammar Ljubijankic" userId="a00b5204-d72f-418c-8b5e-7555aa3641ec" providerId="ADAL" clId="{0D28BE98-19B5-45BC-9736-94050ED36038}" dt="2023-05-22T15:15:18.479" v="12679" actId="700"/>
+          <ac:spMkLst>
+            <pc:docMk/>
+            <pc:sldMk cId="1446615163" sldId="273"/>
+            <ac:spMk id="2" creationId="{53D29636-7C8E-DF06-72A1-2D03905D5258}"/>
+          </ac:spMkLst>
+        </pc:spChg>
+        <pc:spChg chg="del mod ord">
+          <ac:chgData name="Ammar Ljubijankic" userId="a00b5204-d72f-418c-8b5e-7555aa3641ec" providerId="ADAL" clId="{0D28BE98-19B5-45BC-9736-94050ED36038}" dt="2023-05-22T15:15:18.479" v="12679" actId="700"/>
+          <ac:spMkLst>
+            <pc:docMk/>
+            <pc:sldMk cId="1446615163" sldId="273"/>
+            <ac:spMk id="3" creationId="{743DC749-BB46-605A-12DD-CB3CCD61A2B2}"/>
+          </ac:spMkLst>
+        </pc:spChg>
+        <pc:spChg chg="add del mod ord">
+          <ac:chgData name="Ammar Ljubijankic" userId="a00b5204-d72f-418c-8b5e-7555aa3641ec" providerId="ADAL" clId="{0D28BE98-19B5-45BC-9736-94050ED36038}" dt="2023-05-22T15:15:22.587" v="12680" actId="700"/>
+          <ac:spMkLst>
+            <pc:docMk/>
+            <pc:sldMk cId="1446615163" sldId="273"/>
+            <ac:spMk id="4" creationId="{167B8321-B307-57DA-9086-3E86BB30781A}"/>
+          </ac:spMkLst>
+        </pc:spChg>
+        <pc:spChg chg="add del mod ord">
+          <ac:chgData name="Ammar Ljubijankic" userId="a00b5204-d72f-418c-8b5e-7555aa3641ec" providerId="ADAL" clId="{0D28BE98-19B5-45BC-9736-94050ED36038}" dt="2023-05-22T15:15:22.587" v="12680" actId="700"/>
+          <ac:spMkLst>
+            <pc:docMk/>
+            <pc:sldMk cId="1446615163" sldId="273"/>
+            <ac:spMk id="5" creationId="{53986187-8659-54B3-0906-E9933970F88E}"/>
+          </ac:spMkLst>
+        </pc:spChg>
+        <pc:spChg chg="add mod ord">
+          <ac:chgData name="Ammar Ljubijankic" userId="a00b5204-d72f-418c-8b5e-7555aa3641ec" providerId="ADAL" clId="{0D28BE98-19B5-45BC-9736-94050ED36038}" dt="2023-05-22T15:15:25.125" v="12690" actId="20577"/>
+          <ac:spMkLst>
+            <pc:docMk/>
+            <pc:sldMk cId="1446615163" sldId="273"/>
+            <ac:spMk id="6" creationId="{7D42393D-5602-C311-C35D-4B865786CF1A}"/>
+          </ac:spMkLst>
+        </pc:spChg>
+        <pc:spChg chg="add mod ord">
+          <ac:chgData name="Ammar Ljubijankic" userId="a00b5204-d72f-418c-8b5e-7555aa3641ec" providerId="ADAL" clId="{0D28BE98-19B5-45BC-9736-94050ED36038}" dt="2023-05-22T15:15:22.587" v="12680" actId="700"/>
+          <ac:spMkLst>
+            <pc:docMk/>
+            <pc:sldMk cId="1446615163" sldId="273"/>
+            <ac:spMk id="7" creationId="{525FFB7F-39FB-4E97-578C-2815EBDF9413}"/>
+          </ac:spMkLst>
+        </pc:spChg>
       </pc:sldChg>
     </pc:docChg>
   </pc:docChgLst>
@@ -5490,7 +5545,7 @@
           <a:p>
             <a:fld id="{B0D7801C-4118-4057-8985-EC753FF32CC5}" type="datetimeFigureOut">
               <a:rPr lang="en-GB" smtClean="0"/>
-              <a:t>19/05/2023</a:t>
+              <a:t>23/05/2023</a:t>
             </a:fld>
             <a:endParaRPr lang="en-GB"/>
           </a:p>
@@ -6744,7 +6799,7 @@
               <a:defRPr/>
             </a:pPr>
             <a:r>
-              <a:rPr lang="en-GB"/>
+              <a:rPr lang="en-GB" dirty="0"/>
               <a:t>Here we focus on hospitality and health –among the two largest sectors in London by employee counts, but two which show very different trends.</a:t>
             </a:r>
           </a:p>
@@ -6767,7 +6822,7 @@
               <a:defRPr/>
             </a:pPr>
             <a:r>
-              <a:rPr lang="en-GB"/>
+              <a:rPr lang="en-GB" dirty="0"/>
               <a:t>Hospitality: is the sector with the clearest volatility in employment counts, since EU nationals actually made up the largest share for the entire pre-2020 period we have data for. In the aftermath of the pandemic and Brexit, the sector recovered its previous size through an increase in both non-EU workers but in particular due to UK workers, to a much larger extent than we’ve seen in other sectors.</a:t>
             </a:r>
           </a:p>
@@ -6790,7 +6845,7 @@
               <a:defRPr/>
             </a:pPr>
             <a:r>
-              <a:rPr lang="en-GB"/>
+              <a:rPr lang="en-GB" dirty="0"/>
               <a:t>Health: was very different.  Employments held by Non-EU nationals consistently outnumbered EU nationals by around 2:1, so there was not a large loss from EU nationals. Instead, the number of non-EU workers has continued to rise</a:t>
             </a:r>
           </a:p>
@@ -6813,7 +6868,7 @@
               <a:defRPr/>
             </a:pPr>
             <a:r>
-              <a:rPr lang="en-GB"/>
+              <a:rPr lang="en-GB" dirty="0"/>
               <a:t>The difference between these two sectors likely reflect two things</a:t>
             </a:r>
           </a:p>
@@ -6836,7 +6891,7 @@
               <a:defRPr/>
             </a:pPr>
             <a:r>
-              <a:rPr lang="en-GB"/>
+              <a:rPr lang="en-GB" dirty="0"/>
               <a:t>1) the lockdowns meant that many jobs within customer-facing sectors within hospitality were furloughed or closed entirely, leading to a large decline overall, while jobs within health continued to be more important than ever.</a:t>
             </a:r>
           </a:p>
@@ -6859,12 +6914,12 @@
               <a:defRPr/>
             </a:pPr>
             <a:r>
-              <a:rPr lang="en-GB"/>
-              <a:t>2) hospitality jobs are much less likely to qualify for skilled worker visas, as they tend to be low-paid and small businesses would be unlikely to face the large administrative costs in applying for visas. Meanwhile, health has many skilled jobs, and even for lower-skilled jobs there is preferential treatment as it is considered a vital industry by the government.</a:t>
-            </a:r>
-          </a:p>
-          <a:p>
-            <a:endParaRPr lang="en-GB"/>
+              <a:rPr lang="en-GB" dirty="0"/>
+              <a:t>2) hospitality jobs are much less likely to qualify for skilled worker visas, as they tend to be low-paid and small businesses would be unlikely to face the large administrative costs associated with applying for visas. Meanwhile, health has many skilled jobs, and even for lower-skilled jobs there is preferential treatment as it is considered a vital industry by the government.</a:t>
+            </a:r>
+          </a:p>
+          <a:p>
+            <a:endParaRPr lang="en-GB" dirty="0"/>
           </a:p>
         </p:txBody>
       </p:sp>
@@ -6954,7 +7009,7 @@
             </a:pPr>
             <a:r>
               <a:rPr lang="en-GB" dirty="0"/>
-              <a:t>Finally, on the question whether non-EU workers have replaced EU workers “like-for-like”, this does not seem to be the case. These are the ten largest industries in London showing the change in employments in the three years from December 2019 to December 2022. what is immediately clear is that the length of the light and dark pink bars do not generally cancel each other out, which would be the case if a EU held job was replaced by a non-EU held job.</a:t>
+              <a:t>Finally, some quick words on the question of whether non-EU workers have replaced EU workers “like-for-like” within industries, this does not seem to be the case. </a:t>
             </a:r>
           </a:p>
           <a:p>
@@ -6964,7 +7019,7 @@
             </a:pPr>
             <a:r>
               <a:rPr lang="en-GB" dirty="0"/>
-              <a:t>Instead, hospitality is again the outlier with a huge drop in EU employments, but a smaller rise in non-EU employments. As we already saw, UK nationals also contributed to some of the recovery.</a:t>
+              <a:t>These are the ten largest industries in London showing the change in employments in the three years from December 2019 to December 2022. </a:t>
             </a:r>
           </a:p>
           <a:p>
@@ -6974,7 +7029,37 @@
             </a:pPr>
             <a:r>
               <a:rPr lang="en-GB" dirty="0"/>
+              <a:t>what is immediately clear is that the length of the light and dark pink bars do not generally cancel each other out, which would be the case if a EU held job was replaced by a non-EU held job.</a:t>
+            </a:r>
+          </a:p>
+          <a:p>
+            <a:pPr marL="171450" indent="-171450">
+              <a:buFont typeface="Arial" panose="020B0604020202020204" pitchFamily="34" charset="0"/>
+              <a:buChar char="•"/>
+            </a:pPr>
+            <a:r>
+              <a:rPr lang="en-GB" dirty="0"/>
+              <a:t>Instead, hospitality is again the outlier with a huge drop in EU employments, but a smaller rise in non-EU employments. As we already saw, UK nationals also contributed to some of the recovery.</a:t>
+            </a:r>
+          </a:p>
+          <a:p>
+            <a:pPr marL="171450" indent="-171450">
+              <a:buFont typeface="Arial" panose="020B0604020202020204" pitchFamily="34" charset="0"/>
+              <a:buChar char="•"/>
+            </a:pPr>
+            <a:r>
+              <a:rPr lang="en-GB" dirty="0"/>
               <a:t>In most other industries, the gain in non-EU employments outpaced the loss in EU employments.</a:t>
+            </a:r>
+          </a:p>
+          <a:p>
+            <a:pPr marL="171450" indent="-171450">
+              <a:buFont typeface="Arial" panose="020B0604020202020204" pitchFamily="34" charset="0"/>
+              <a:buChar char="•"/>
+            </a:pPr>
+            <a:r>
+              <a:rPr lang="en-GB" dirty="0"/>
+              <a:t>Overall, we can tentatively conclude that it is not necessarily a true replacement effect that has been occurring over the past few years, but rather a number of different trends across areas and industries which has led to the overall results.</a:t>
             </a:r>
           </a:p>
         </p:txBody>
@@ -7080,7 +7165,7 @@
           <a:p>
             <a:fld id="{80BB385F-F8C7-4553-B276-396FE16CAEB0}" type="slidenum">
               <a:rPr lang="en-GB" smtClean="0"/>
-              <a:t>12</a:t>
+              <a:t>13</a:t>
             </a:fld>
             <a:endParaRPr lang="en-GB"/>
           </a:p>
@@ -13007,35 +13092,38 @@
           </a:bodyPr>
           <a:lstStyle/>
           <a:p>
-            <a:r>
-              <a:rPr lang="en-GB" sz="3600"/>
-              <a:t>For more, see our analysis on the </a:t>
-            </a:r>
-            <a:r>
-              <a:rPr lang="en-GB" sz="3600">
+            <a:endParaRPr lang="en-GB" sz="3600" dirty="0"/>
+          </a:p>
+          <a:p>
+            <a:r>
+              <a:rPr lang="en-GB" sz="3600" dirty="0"/>
+              <a:t>For more, see our analysis on the GLA </a:t>
+            </a:r>
+            <a:r>
+              <a:rPr lang="en-GB" sz="3600" dirty="0">
                 <a:hlinkClick r:id="rId2"/>
               </a:rPr>
               <a:t>Datastore</a:t>
             </a:r>
-            <a:endParaRPr lang="en-GB" sz="3600"/>
-          </a:p>
-          <a:p>
-            <a:endParaRPr lang="en-GB" sz="3600"/>
-          </a:p>
-          <a:p>
-            <a:r>
-              <a:rPr lang="en-GB" sz="3600"/>
-              <a:t>Questions and discussion </a:t>
-            </a:r>
-          </a:p>
-          <a:p>
-            <a:pPr marL="457200" lvl="1" indent="0">
-              <a:buNone/>
-            </a:pPr>
-            <a:r>
-              <a:rPr lang="en-GB" sz="3200"/>
-              <a:t>- with Denis Kierans from the Migration Observatory</a:t>
-            </a:r>
+            <a:endParaRPr lang="en-GB" sz="3600" dirty="0"/>
+          </a:p>
+          <a:p>
+            <a:endParaRPr lang="en-GB" sz="3600" dirty="0"/>
+          </a:p>
+          <a:p>
+            <a:endParaRPr lang="en-GB" sz="3600" dirty="0"/>
+          </a:p>
+          <a:p>
+            <a:r>
+              <a:rPr lang="en-GB" sz="3600" dirty="0"/>
+              <a:t>Guest: Denis Kierans from the Migration Observatory</a:t>
+            </a:r>
+          </a:p>
+          <a:p>
+            <a:endParaRPr lang="en-GB" sz="3600" dirty="0"/>
+          </a:p>
+          <a:p>
+            <a:endParaRPr lang="en-GB" sz="3600" dirty="0"/>
           </a:p>
         </p:txBody>
       </p:sp>
@@ -13074,6 +13162,89 @@
           <p:cNvPr id="6" name="Title 5">
             <a:extLst>
               <a:ext uri="{FF2B5EF4-FFF2-40B4-BE49-F238E27FC236}">
+                <a16:creationId xmlns:a16="http://schemas.microsoft.com/office/drawing/2014/main" id="{7D42393D-5602-C311-C35D-4B865786CF1A}"/>
+              </a:ext>
+            </a:extLst>
+          </p:cNvPr>
+          <p:cNvSpPr>
+            <a:spLocks noGrp="1"/>
+          </p:cNvSpPr>
+          <p:nvPr>
+            <p:ph type="title"/>
+          </p:nvPr>
+        </p:nvSpPr>
+        <p:spPr/>
+        <p:txBody>
+          <a:bodyPr/>
+          <a:lstStyle/>
+          <a:p>
+            <a:r>
+              <a:rPr lang="en-GB" dirty="0"/>
+              <a:t>Questions?</a:t>
+            </a:r>
+          </a:p>
+        </p:txBody>
+      </p:sp>
+      <p:sp>
+        <p:nvSpPr>
+          <p:cNvPr id="7" name="Text Placeholder 6">
+            <a:extLst>
+              <a:ext uri="{FF2B5EF4-FFF2-40B4-BE49-F238E27FC236}">
+                <a16:creationId xmlns:a16="http://schemas.microsoft.com/office/drawing/2014/main" id="{525FFB7F-39FB-4E97-578C-2815EBDF9413}"/>
+              </a:ext>
+            </a:extLst>
+          </p:cNvPr>
+          <p:cNvSpPr>
+            <a:spLocks noGrp="1"/>
+          </p:cNvSpPr>
+          <p:nvPr>
+            <p:ph type="body" idx="1"/>
+          </p:nvPr>
+        </p:nvSpPr>
+        <p:spPr/>
+        <p:txBody>
+          <a:bodyPr/>
+          <a:lstStyle/>
+          <a:p>
+            <a:endParaRPr lang="en-GB"/>
+          </a:p>
+        </p:txBody>
+      </p:sp>
+    </p:spTree>
+    <p:extLst>
+      <p:ext uri="{BB962C8B-B14F-4D97-AF65-F5344CB8AC3E}">
+        <p14:creationId xmlns:p14="http://schemas.microsoft.com/office/powerpoint/2010/main" val="1446615163"/>
+      </p:ext>
+    </p:extLst>
+  </p:cSld>
+  <p:clrMapOvr>
+    <a:masterClrMapping/>
+  </p:clrMapOvr>
+</p:sld>
+</file>
+
+<file path=ppt/slides/slide12.xml><?xml version="1.0" encoding="utf-8"?>
+<p:sld xmlns:a="http://schemas.openxmlformats.org/drawingml/2006/main" xmlns:r="http://schemas.openxmlformats.org/officeDocument/2006/relationships" xmlns:p="http://schemas.openxmlformats.org/presentationml/2006/main">
+  <p:cSld>
+    <p:spTree>
+      <p:nvGrpSpPr>
+        <p:cNvPr id="1" name=""/>
+        <p:cNvGrpSpPr/>
+        <p:nvPr/>
+      </p:nvGrpSpPr>
+      <p:grpSpPr>
+        <a:xfrm>
+          <a:off x="0" y="0"/>
+          <a:ext cx="0" cy="0"/>
+          <a:chOff x="0" y="0"/>
+          <a:chExt cx="0" cy="0"/>
+        </a:xfrm>
+      </p:grpSpPr>
+      <p:sp>
+        <p:nvSpPr>
+          <p:cNvPr id="6" name="Title 5">
+            <a:extLst>
+              <a:ext uri="{FF2B5EF4-FFF2-40B4-BE49-F238E27FC236}">
                 <a16:creationId xmlns:a16="http://schemas.microsoft.com/office/drawing/2014/main" id="{3C2C4515-ED19-B257-4A1C-287A4A940DBF}"/>
               </a:ext>
             </a:extLst>
@@ -13135,7 +13306,7 @@
 </p:sld>
 </file>
 
-<file path=ppt/slides/slide12.xml><?xml version="1.0" encoding="utf-8"?>
+<file path=ppt/slides/slide13.xml><?xml version="1.0" encoding="utf-8"?>
 <p:sld xmlns:a="http://schemas.openxmlformats.org/drawingml/2006/main" xmlns:r="http://schemas.openxmlformats.org/officeDocument/2006/relationships" xmlns:p="http://schemas.openxmlformats.org/presentationml/2006/main">
   <p:cSld>
     <p:spTree>
@@ -13277,158 +13448,6 @@
     <p:extLst>
       <p:ext uri="{BB962C8B-B14F-4D97-AF65-F5344CB8AC3E}">
         <p14:creationId xmlns:p14="http://schemas.microsoft.com/office/powerpoint/2010/main" val="379951531"/>
-      </p:ext>
-    </p:extLst>
-  </p:cSld>
-  <p:clrMapOvr>
-    <a:masterClrMapping/>
-  </p:clrMapOvr>
-</p:sld>
-</file>
-
-<file path=ppt/slides/slide13.xml><?xml version="1.0" encoding="utf-8"?>
-<p:sld xmlns:a="http://schemas.openxmlformats.org/drawingml/2006/main" xmlns:r="http://schemas.openxmlformats.org/officeDocument/2006/relationships" xmlns:p="http://schemas.openxmlformats.org/presentationml/2006/main">
-  <p:cSld>
-    <p:spTree>
-      <p:nvGrpSpPr>
-        <p:cNvPr id="1" name=""/>
-        <p:cNvGrpSpPr/>
-        <p:nvPr/>
-      </p:nvGrpSpPr>
-      <p:grpSpPr>
-        <a:xfrm>
-          <a:off x="0" y="0"/>
-          <a:ext cx="0" cy="0"/>
-          <a:chOff x="0" y="0"/>
-          <a:chExt cx="0" cy="0"/>
-        </a:xfrm>
-      </p:grpSpPr>
-      <p:sp>
-        <p:nvSpPr>
-          <p:cNvPr id="4" name="Title 3">
-            <a:extLst>
-              <a:ext uri="{FF2B5EF4-FFF2-40B4-BE49-F238E27FC236}">
-                <a16:creationId xmlns:a16="http://schemas.microsoft.com/office/drawing/2014/main" id="{0603B33E-38E6-E566-F285-AB11F8C766B5}"/>
-              </a:ext>
-            </a:extLst>
-          </p:cNvPr>
-          <p:cNvSpPr>
-            <a:spLocks noGrp="1"/>
-          </p:cNvSpPr>
-          <p:nvPr>
-            <p:ph type="title"/>
-          </p:nvPr>
-        </p:nvSpPr>
-        <p:spPr/>
-        <p:txBody>
-          <a:bodyPr/>
-          <a:lstStyle/>
-          <a:p>
-            <a:r>
-              <a:rPr lang="en-GB"/>
-              <a:t>Share by nationality in London, by industry</a:t>
-            </a:r>
-          </a:p>
-        </p:txBody>
-      </p:sp>
-      <p:pic>
-        <p:nvPicPr>
-          <p:cNvPr id="7" name="Content Placeholder 6" descr="A picture containing text, screenshot, font, number&#10;&#10;Description automatically generated">
-            <a:extLst>
-              <a:ext uri="{FF2B5EF4-FFF2-40B4-BE49-F238E27FC236}">
-                <a16:creationId xmlns:a16="http://schemas.microsoft.com/office/drawing/2014/main" id="{D026D0BF-929E-D861-531C-B543B2A20B41}"/>
-              </a:ext>
-            </a:extLst>
-          </p:cNvPr>
-          <p:cNvPicPr>
-            <a:picLocks noGrp="1" noChangeAspect="1"/>
-          </p:cNvPicPr>
-          <p:nvPr>
-            <p:ph idx="1"/>
-          </p:nvPr>
-        </p:nvPicPr>
-        <p:blipFill>
-          <a:blip r:embed="rId2">
-            <a:extLst>
-              <a:ext uri="{28A0092B-C50C-407E-A947-70E740481C1C}">
-                <a14:useLocalDpi xmlns:a14="http://schemas.microsoft.com/office/drawing/2010/main" val="0"/>
-              </a:ext>
-            </a:extLst>
-          </a:blip>
-          <a:stretch>
-            <a:fillRect/>
-          </a:stretch>
-        </p:blipFill>
-        <p:spPr>
-          <a:xfrm>
-            <a:off x="2895593" y="1297777"/>
-            <a:ext cx="6400813" cy="4572009"/>
-          </a:xfrm>
-        </p:spPr>
-      </p:pic>
-      <p:sp>
-        <p:nvSpPr>
-          <p:cNvPr id="2" name="TextBox 1">
-            <a:extLst>
-              <a:ext uri="{FF2B5EF4-FFF2-40B4-BE49-F238E27FC236}">
-                <a16:creationId xmlns:a16="http://schemas.microsoft.com/office/drawing/2014/main" id="{5ADC7368-BD14-1D79-F2B2-A41C222966EE}"/>
-              </a:ext>
-            </a:extLst>
-          </p:cNvPr>
-          <p:cNvSpPr txBox="1"/>
-          <p:nvPr/>
-        </p:nvSpPr>
-        <p:spPr>
-          <a:xfrm>
-            <a:off x="344245" y="6176963"/>
-            <a:ext cx="9509760" cy="461665"/>
-          </a:xfrm>
-          <a:prstGeom prst="rect">
-            <a:avLst/>
-          </a:prstGeom>
-          <a:noFill/>
-        </p:spPr>
-        <p:txBody>
-          <a:bodyPr wrap="square" rtlCol="0">
-            <a:spAutoFit/>
-          </a:bodyPr>
-          <a:lstStyle/>
-          <a:p>
-            <a:r>
-              <a:rPr lang="en-GB" sz="1200" b="0" i="0" dirty="0">
-                <a:solidFill>
-                  <a:srgbClr val="A6A6A6"/>
-                </a:solidFill>
-                <a:effectLst/>
-                <a:latin typeface="Arial" panose="020B0604020202020204" pitchFamily="34" charset="0"/>
-              </a:rPr>
-              <a:t>Source: HM Revenue and Customs – Pay As You Earn Real Time Information (non-seasonally adjusted) and Migrant Worker Scan.</a:t>
-            </a:r>
-            <a:br>
-              <a:rPr lang="en-GB" sz="1200" dirty="0"/>
-            </a:br>
-            <a:r>
-              <a:rPr lang="en-GB" sz="1200" b="0" i="0" dirty="0">
-                <a:solidFill>
-                  <a:srgbClr val="A6A6A6"/>
-                </a:solidFill>
-                <a:effectLst/>
-                <a:latin typeface="Arial" panose="020B0604020202020204" pitchFamily="34" charset="0"/>
-              </a:rPr>
-              <a:t>Note: Estimates are based on where employees live. Top ten sectors by employee count, ranked by overall increase in employees.</a:t>
-            </a:r>
-            <a:endParaRPr lang="en-GB" sz="1200" dirty="0">
-              <a:solidFill>
-                <a:schemeClr val="bg2"/>
-              </a:solidFill>
-            </a:endParaRPr>
-          </a:p>
-        </p:txBody>
-      </p:sp>
-    </p:spTree>
-    <p:extLst>
-      <p:ext uri="{BB962C8B-B14F-4D97-AF65-F5344CB8AC3E}">
-        <p14:creationId xmlns:p14="http://schemas.microsoft.com/office/powerpoint/2010/main" val="1921322513"/>
       </p:ext>
     </p:extLst>
   </p:cSld>

</xml_diff>